<commit_message>
Updated to add heatmap and markercluster
</commit_message>
<xml_diff>
--- a/Moving_violations_2018.pptx
+++ b/Moving_violations_2018.pptx
@@ -5,19 +5,21 @@
     <p:sldMasterId id="2147483668" r:id="rId1"/>
   </p:sldMasterIdLst>
   <p:notesMasterIdLst>
-    <p:notesMasterId r:id="rId9"/>
+    <p:notesMasterId r:id="rId11"/>
   </p:notesMasterIdLst>
   <p:handoutMasterIdLst>
-    <p:handoutMasterId r:id="rId10"/>
+    <p:handoutMasterId r:id="rId12"/>
   </p:handoutMasterIdLst>
   <p:sldIdLst>
     <p:sldId id="513" r:id="rId2"/>
     <p:sldId id="511" r:id="rId3"/>
-    <p:sldId id="512" r:id="rId4"/>
-    <p:sldId id="514" r:id="rId5"/>
-    <p:sldId id="516" r:id="rId6"/>
-    <p:sldId id="470" r:id="rId7"/>
-    <p:sldId id="515" r:id="rId8"/>
+    <p:sldId id="518" r:id="rId4"/>
+    <p:sldId id="512" r:id="rId5"/>
+    <p:sldId id="514" r:id="rId6"/>
+    <p:sldId id="516" r:id="rId7"/>
+    <p:sldId id="470" r:id="rId8"/>
+    <p:sldId id="517" r:id="rId9"/>
+    <p:sldId id="515" r:id="rId10"/>
   </p:sldIdLst>
   <p:sldSz cx="9144000" cy="6858000" type="screen4x3"/>
   <p:notesSz cx="7315200" cy="9601200"/>
@@ -801,7 +803,7 @@
           <a:p>
             <a:fld id="{F4EE911A-504C-45E1-9DD1-A7318D673F80}" type="slidenum">
               <a:rPr lang="en-US" smtClean="0"/>
-              <a:t>4</a:t>
+              <a:t>3</a:t>
             </a:fld>
             <a:endParaRPr lang="en-US"/>
           </a:p>
@@ -810,7 +812,7 @@
     </p:spTree>
     <p:extLst>
       <p:ext uri="{BB962C8B-B14F-4D97-AF65-F5344CB8AC3E}">
-        <p14:creationId xmlns:p14="http://schemas.microsoft.com/office/powerpoint/2010/main" val="1504046233"/>
+        <p14:creationId xmlns:p14="http://schemas.microsoft.com/office/powerpoint/2010/main" val="394064388"/>
       </p:ext>
     </p:extLst>
   </p:cSld>
@@ -894,7 +896,7 @@
     </p:spTree>
     <p:extLst>
       <p:ext uri="{BB962C8B-B14F-4D97-AF65-F5344CB8AC3E}">
-        <p14:creationId xmlns:p14="http://schemas.microsoft.com/office/powerpoint/2010/main" val="4257919509"/>
+        <p14:creationId xmlns:p14="http://schemas.microsoft.com/office/powerpoint/2010/main" val="1504046233"/>
       </p:ext>
     </p:extLst>
   </p:cSld>
@@ -959,7 +961,7 @@
             <a:spLocks noGrp="1"/>
           </p:cNvSpPr>
           <p:nvPr>
-            <p:ph type="sldNum" sz="quarter" idx="10"/>
+            <p:ph type="sldNum" sz="quarter" idx="5"/>
           </p:nvPr>
         </p:nvSpPr>
         <p:spPr/>
@@ -978,7 +980,175 @@
     </p:spTree>
     <p:extLst>
       <p:ext uri="{BB962C8B-B14F-4D97-AF65-F5344CB8AC3E}">
+        <p14:creationId xmlns:p14="http://schemas.microsoft.com/office/powerpoint/2010/main" val="4257919509"/>
+      </p:ext>
+    </p:extLst>
+  </p:cSld>
+  <p:clrMapOvr>
+    <a:masterClrMapping/>
+  </p:clrMapOvr>
+</p:notes>
+</file>
+
+<file path=ppt/notesSlides/notesSlide5.xml><?xml version="1.0" encoding="utf-8"?>
+<p:notes xmlns:a="http://schemas.openxmlformats.org/drawingml/2006/main" xmlns:r="http://schemas.openxmlformats.org/officeDocument/2006/relationships" xmlns:p="http://schemas.openxmlformats.org/presentationml/2006/main">
+  <p:cSld>
+    <p:spTree>
+      <p:nvGrpSpPr>
+        <p:cNvPr id="1" name=""/>
+        <p:cNvGrpSpPr/>
+        <p:nvPr/>
+      </p:nvGrpSpPr>
+      <p:grpSpPr>
+        <a:xfrm>
+          <a:off x="0" y="0"/>
+          <a:ext cx="0" cy="0"/>
+          <a:chOff x="0" y="0"/>
+          <a:chExt cx="0" cy="0"/>
+        </a:xfrm>
+      </p:grpSpPr>
+      <p:sp>
+        <p:nvSpPr>
+          <p:cNvPr id="2" name="Slide Image Placeholder 1"/>
+          <p:cNvSpPr>
+            <a:spLocks noGrp="1" noRot="1" noChangeAspect="1"/>
+          </p:cNvSpPr>
+          <p:nvPr>
+            <p:ph type="sldImg"/>
+          </p:nvPr>
+        </p:nvSpPr>
+        <p:spPr/>
+      </p:sp>
+      <p:sp>
+        <p:nvSpPr>
+          <p:cNvPr id="3" name="Notes Placeholder 2"/>
+          <p:cNvSpPr>
+            <a:spLocks noGrp="1"/>
+          </p:cNvSpPr>
+          <p:nvPr>
+            <p:ph type="body" idx="1"/>
+          </p:nvPr>
+        </p:nvSpPr>
+        <p:spPr/>
+        <p:txBody>
+          <a:bodyPr/>
+          <a:lstStyle/>
+          <a:p>
+            <a:endParaRPr lang="en-US" dirty="0"/>
+          </a:p>
+        </p:txBody>
+      </p:sp>
+      <p:sp>
+        <p:nvSpPr>
+          <p:cNvPr id="4" name="Slide Number Placeholder 3"/>
+          <p:cNvSpPr>
+            <a:spLocks noGrp="1"/>
+          </p:cNvSpPr>
+          <p:nvPr>
+            <p:ph type="sldNum" sz="quarter" idx="10"/>
+          </p:nvPr>
+        </p:nvSpPr>
+        <p:spPr/>
+        <p:txBody>
+          <a:bodyPr/>
+          <a:lstStyle/>
+          <a:p>
+            <a:fld id="{F4EE911A-504C-45E1-9DD1-A7318D673F80}" type="slidenum">
+              <a:rPr lang="en-US" smtClean="0"/>
+              <a:t>7</a:t>
+            </a:fld>
+            <a:endParaRPr lang="en-US"/>
+          </a:p>
+        </p:txBody>
+      </p:sp>
+    </p:spTree>
+    <p:extLst>
+      <p:ext uri="{BB962C8B-B14F-4D97-AF65-F5344CB8AC3E}">
         <p14:creationId xmlns:p14="http://schemas.microsoft.com/office/powerpoint/2010/main" val="1594111125"/>
+      </p:ext>
+    </p:extLst>
+  </p:cSld>
+  <p:clrMapOvr>
+    <a:masterClrMapping/>
+  </p:clrMapOvr>
+</p:notes>
+</file>
+
+<file path=ppt/notesSlides/notesSlide6.xml><?xml version="1.0" encoding="utf-8"?>
+<p:notes xmlns:a="http://schemas.openxmlformats.org/drawingml/2006/main" xmlns:r="http://schemas.openxmlformats.org/officeDocument/2006/relationships" xmlns:p="http://schemas.openxmlformats.org/presentationml/2006/main">
+  <p:cSld>
+    <p:spTree>
+      <p:nvGrpSpPr>
+        <p:cNvPr id="1" name=""/>
+        <p:cNvGrpSpPr/>
+        <p:nvPr/>
+      </p:nvGrpSpPr>
+      <p:grpSpPr>
+        <a:xfrm>
+          <a:off x="0" y="0"/>
+          <a:ext cx="0" cy="0"/>
+          <a:chOff x="0" y="0"/>
+          <a:chExt cx="0" cy="0"/>
+        </a:xfrm>
+      </p:grpSpPr>
+      <p:sp>
+        <p:nvSpPr>
+          <p:cNvPr id="2" name="Slide Image Placeholder 1"/>
+          <p:cNvSpPr>
+            <a:spLocks noGrp="1" noRot="1" noChangeAspect="1"/>
+          </p:cNvSpPr>
+          <p:nvPr>
+            <p:ph type="sldImg"/>
+          </p:nvPr>
+        </p:nvSpPr>
+        <p:spPr/>
+      </p:sp>
+      <p:sp>
+        <p:nvSpPr>
+          <p:cNvPr id="3" name="Notes Placeholder 2"/>
+          <p:cNvSpPr>
+            <a:spLocks noGrp="1"/>
+          </p:cNvSpPr>
+          <p:nvPr>
+            <p:ph type="body" idx="1"/>
+          </p:nvPr>
+        </p:nvSpPr>
+        <p:spPr/>
+        <p:txBody>
+          <a:bodyPr/>
+          <a:lstStyle/>
+          <a:p>
+            <a:endParaRPr lang="en-US" dirty="0"/>
+          </a:p>
+        </p:txBody>
+      </p:sp>
+      <p:sp>
+        <p:nvSpPr>
+          <p:cNvPr id="4" name="Slide Number Placeholder 3"/>
+          <p:cNvSpPr>
+            <a:spLocks noGrp="1"/>
+          </p:cNvSpPr>
+          <p:nvPr>
+            <p:ph type="sldNum" sz="quarter" idx="10"/>
+          </p:nvPr>
+        </p:nvSpPr>
+        <p:spPr/>
+        <p:txBody>
+          <a:bodyPr/>
+          <a:lstStyle/>
+          <a:p>
+            <a:fld id="{F4EE911A-504C-45E1-9DD1-A7318D673F80}" type="slidenum">
+              <a:rPr lang="en-US" smtClean="0"/>
+              <a:t>8</a:t>
+            </a:fld>
+            <a:endParaRPr lang="en-US"/>
+          </a:p>
+        </p:txBody>
+      </p:sp>
+    </p:spTree>
+    <p:extLst>
+      <p:ext uri="{BB962C8B-B14F-4D97-AF65-F5344CB8AC3E}">
+        <p14:creationId xmlns:p14="http://schemas.microsoft.com/office/powerpoint/2010/main" val="761973040"/>
       </p:ext>
     </p:extLst>
   </p:cSld>
@@ -3644,6 +3814,113 @@
             <p:ph type="title"/>
           </p:nvPr>
         </p:nvSpPr>
+        <p:spPr>
+          <a:xfrm>
+            <a:off x="304800" y="0"/>
+            <a:ext cx="8763000" cy="653854"/>
+          </a:xfrm>
+        </p:spPr>
+        <p:txBody>
+          <a:bodyPr/>
+          <a:lstStyle/>
+          <a:p>
+            <a:r>
+              <a:rPr lang="en-US" dirty="0"/>
+              <a:t>Data wrangling – Transform to construct </a:t>
+            </a:r>
+            <a:r>
+              <a:rPr lang="en-US" dirty="0" err="1"/>
+              <a:t>geojson</a:t>
+            </a:r>
+            <a:r>
+              <a:rPr lang="en-US" dirty="0"/>
+              <a:t> object</a:t>
+            </a:r>
+          </a:p>
+        </p:txBody>
+      </p:sp>
+      <p:pic>
+        <p:nvPicPr>
+          <p:cNvPr id="3" name="Picture 2">
+            <a:extLst>
+              <a:ext uri="{FF2B5EF4-FFF2-40B4-BE49-F238E27FC236}">
+                <a16:creationId xmlns:a16="http://schemas.microsoft.com/office/drawing/2014/main" id="{F7601EAD-A680-443C-BA0E-87E67F64E44A}"/>
+              </a:ext>
+            </a:extLst>
+          </p:cNvPr>
+          <p:cNvPicPr>
+            <a:picLocks noChangeAspect="1"/>
+          </p:cNvPicPr>
+          <p:nvPr/>
+        </p:nvPicPr>
+        <p:blipFill>
+          <a:blip r:embed="rId3"/>
+          <a:stretch>
+            <a:fillRect/>
+          </a:stretch>
+        </p:blipFill>
+        <p:spPr>
+          <a:xfrm>
+            <a:off x="0" y="653854"/>
+            <a:ext cx="9144000" cy="5746946"/>
+          </a:xfrm>
+          <a:prstGeom prst="rect">
+            <a:avLst/>
+          </a:prstGeom>
+        </p:spPr>
+      </p:pic>
+    </p:spTree>
+    <p:extLst>
+      <p:ext uri="{BB962C8B-B14F-4D97-AF65-F5344CB8AC3E}">
+        <p14:creationId xmlns:p14="http://schemas.microsoft.com/office/powerpoint/2010/main" val="3187243453"/>
+      </p:ext>
+    </p:extLst>
+  </p:cSld>
+  <p:clrMapOvr>
+    <a:masterClrMapping/>
+  </p:clrMapOvr>
+  <mc:AlternateContent xmlns:mc="http://schemas.openxmlformats.org/markup-compatibility/2006" xmlns:p14="http://schemas.microsoft.com/office/powerpoint/2010/main">
+    <mc:Choice Requires="p14">
+      <p:transition p14:dur="300">
+        <p:fade/>
+      </p:transition>
+    </mc:Choice>
+    <mc:Fallback xmlns="">
+      <p:transition>
+        <p:fade/>
+      </p:transition>
+    </mc:Fallback>
+  </mc:AlternateContent>
+</p:sld>
+</file>
+
+<file path=ppt/slides/slide4.xml><?xml version="1.0" encoding="utf-8"?>
+<p:sld xmlns:a="http://schemas.openxmlformats.org/drawingml/2006/main" xmlns:r="http://schemas.openxmlformats.org/officeDocument/2006/relationships" xmlns:p="http://schemas.openxmlformats.org/presentationml/2006/main">
+  <p:cSld>
+    <p:spTree>
+      <p:nvGrpSpPr>
+        <p:cNvPr id="1" name=""/>
+        <p:cNvGrpSpPr/>
+        <p:nvPr/>
+      </p:nvGrpSpPr>
+      <p:grpSpPr>
+        <a:xfrm>
+          <a:off x="0" y="0"/>
+          <a:ext cx="0" cy="0"/>
+          <a:chOff x="0" y="0"/>
+          <a:chExt cx="0" cy="0"/>
+        </a:xfrm>
+      </p:grpSpPr>
+      <p:sp>
+        <p:nvSpPr>
+          <p:cNvPr id="2" name="Title 1"/>
+          <p:cNvSpPr>
+            <a:spLocks noGrp="1"/>
+          </p:cNvSpPr>
+          <p:nvPr>
+            <p:ph type="title"/>
+          </p:nvPr>
+        </p:nvSpPr>
         <p:spPr/>
         <p:txBody>
           <a:bodyPr/>
@@ -3741,7 +4018,7 @@
 </p:sld>
 </file>
 
-<file path=ppt/slides/slide4.xml><?xml version="1.0" encoding="utf-8"?>
+<file path=ppt/slides/slide5.xml><?xml version="1.0" encoding="utf-8"?>
 <p:sld xmlns:a="http://schemas.openxmlformats.org/drawingml/2006/main" xmlns:r="http://schemas.openxmlformats.org/officeDocument/2006/relationships" xmlns:p="http://schemas.openxmlformats.org/presentationml/2006/main">
   <p:cSld>
     <p:spTree>
@@ -3865,7 +4142,7 @@
 </p:sld>
 </file>
 
-<file path=ppt/slides/slide5.xml><?xml version="1.0" encoding="utf-8"?>
+<file path=ppt/slides/slide6.xml><?xml version="1.0" encoding="utf-8"?>
 <p:sld xmlns:a="http://schemas.openxmlformats.org/drawingml/2006/main" xmlns:r="http://schemas.openxmlformats.org/officeDocument/2006/relationships" xmlns:p="http://schemas.openxmlformats.org/presentationml/2006/main">
   <p:cSld>
     <p:spTree>
@@ -3989,7 +4266,7 @@
 </p:sld>
 </file>
 
-<file path=ppt/slides/slide6.xml><?xml version="1.0" encoding="utf-8"?>
+<file path=ppt/slides/slide7.xml><?xml version="1.0" encoding="utf-8"?>
 <p:sld xmlns:a="http://schemas.openxmlformats.org/drawingml/2006/main" xmlns:r="http://schemas.openxmlformats.org/officeDocument/2006/relationships" xmlns:p="http://schemas.openxmlformats.org/presentationml/2006/main">
   <p:cSld>
     <p:spTree>
@@ -4030,22 +4307,17 @@
           <a:p>
             <a:r>
               <a:rPr lang="en-US" dirty="0"/>
-              <a:t>DC Map Moving Violation - </a:t>
-            </a:r>
-            <a:r>
-              <a:rPr lang="en-US" dirty="0" err="1"/>
-              <a:t>Geojson</a:t>
-            </a:r>
-            <a:endParaRPr lang="en-US" dirty="0"/>
+              <a:t>DC Map Moving Violation - Heatmap</a:t>
+            </a:r>
           </a:p>
         </p:txBody>
       </p:sp>
       <p:pic>
         <p:nvPicPr>
-          <p:cNvPr id="3" name="Picture 2">
+          <p:cNvPr id="5" name="Picture 4">
             <a:extLst>
               <a:ext uri="{FF2B5EF4-FFF2-40B4-BE49-F238E27FC236}">
-                <a16:creationId xmlns:a16="http://schemas.microsoft.com/office/drawing/2014/main" id="{F8719841-E8B3-4AE5-B93E-7772A45B3C26}"/>
+                <a16:creationId xmlns:a16="http://schemas.microsoft.com/office/drawing/2014/main" id="{3DC6D31F-7580-4FF3-A721-A8F5F21EFB50}"/>
               </a:ext>
             </a:extLst>
           </p:cNvPr>
@@ -4062,8 +4334,8 @@
         </p:blipFill>
         <p:spPr>
           <a:xfrm>
-            <a:off x="76200" y="699656"/>
-            <a:ext cx="8915400" cy="5624944"/>
+            <a:off x="0" y="699654"/>
+            <a:ext cx="9144000" cy="5777346"/>
           </a:xfrm>
           <a:prstGeom prst="rect">
             <a:avLst/>
@@ -4086,7 +4358,104 @@
 </p:sld>
 </file>
 
-<file path=ppt/slides/slide7.xml><?xml version="1.0" encoding="utf-8"?>
+<file path=ppt/slides/slide8.xml><?xml version="1.0" encoding="utf-8"?>
+<p:sld xmlns:a="http://schemas.openxmlformats.org/drawingml/2006/main" xmlns:r="http://schemas.openxmlformats.org/officeDocument/2006/relationships" xmlns:p="http://schemas.openxmlformats.org/presentationml/2006/main">
+  <p:cSld>
+    <p:spTree>
+      <p:nvGrpSpPr>
+        <p:cNvPr id="1" name=""/>
+        <p:cNvGrpSpPr/>
+        <p:nvPr/>
+      </p:nvGrpSpPr>
+      <p:grpSpPr>
+        <a:xfrm>
+          <a:off x="0" y="0"/>
+          <a:ext cx="0" cy="0"/>
+          <a:chOff x="0" y="0"/>
+          <a:chExt cx="0" cy="0"/>
+        </a:xfrm>
+      </p:grpSpPr>
+      <p:sp>
+        <p:nvSpPr>
+          <p:cNvPr id="2" name="Title 1"/>
+          <p:cNvSpPr>
+            <a:spLocks noGrp="1"/>
+          </p:cNvSpPr>
+          <p:nvPr>
+            <p:ph type="title"/>
+          </p:nvPr>
+        </p:nvSpPr>
+        <p:spPr>
+          <a:xfrm>
+            <a:off x="381000" y="45801"/>
+            <a:ext cx="6324600" cy="653854"/>
+          </a:xfrm>
+        </p:spPr>
+        <p:txBody>
+          <a:bodyPr>
+            <a:normAutofit/>
+          </a:bodyPr>
+          <a:lstStyle/>
+          <a:p>
+            <a:r>
+              <a:rPr lang="en-US" dirty="0"/>
+              <a:t>DC Map Moving Violation - </a:t>
+            </a:r>
+            <a:r>
+              <a:rPr lang="en-US" dirty="0" err="1"/>
+              <a:t>MarkerCluster</a:t>
+            </a:r>
+            <a:endParaRPr lang="en-US" dirty="0"/>
+          </a:p>
+        </p:txBody>
+      </p:sp>
+      <p:pic>
+        <p:nvPicPr>
+          <p:cNvPr id="4" name="Picture 3">
+            <a:extLst>
+              <a:ext uri="{FF2B5EF4-FFF2-40B4-BE49-F238E27FC236}">
+                <a16:creationId xmlns:a16="http://schemas.microsoft.com/office/drawing/2014/main" id="{FAB22C59-708B-479C-92FE-6269F593EF80}"/>
+              </a:ext>
+            </a:extLst>
+          </p:cNvPr>
+          <p:cNvPicPr>
+            <a:picLocks noChangeAspect="1"/>
+          </p:cNvPicPr>
+          <p:nvPr/>
+        </p:nvPicPr>
+        <p:blipFill>
+          <a:blip r:embed="rId3"/>
+          <a:stretch>
+            <a:fillRect/>
+          </a:stretch>
+        </p:blipFill>
+        <p:spPr>
+          <a:xfrm>
+            <a:off x="0" y="699655"/>
+            <a:ext cx="9143999" cy="5727942"/>
+          </a:xfrm>
+          <a:prstGeom prst="rect">
+            <a:avLst/>
+          </a:prstGeom>
+        </p:spPr>
+      </p:pic>
+    </p:spTree>
+    <p:extLst>
+      <p:ext uri="{BB962C8B-B14F-4D97-AF65-F5344CB8AC3E}">
+        <p14:creationId xmlns:p14="http://schemas.microsoft.com/office/powerpoint/2010/main" val="2228733101"/>
+      </p:ext>
+    </p:extLst>
+  </p:cSld>
+  <p:clrMapOvr>
+    <a:masterClrMapping/>
+  </p:clrMapOvr>
+  <p:transition>
+    <p:fade/>
+  </p:transition>
+</p:sld>
+</file>
+
+<file path=ppt/slides/slide9.xml><?xml version="1.0" encoding="utf-8"?>
 <p:sld xmlns:a="http://schemas.openxmlformats.org/drawingml/2006/main" xmlns:r="http://schemas.openxmlformats.org/officeDocument/2006/relationships" xmlns:p="http://schemas.openxmlformats.org/presentationml/2006/main">
   <p:cSld>
     <p:spTree>

</xml_diff>